<commit_message>
Enganei-me numa imagem do pp
</commit_message>
<xml_diff>
--- a/Apresentações/Apresentação2204.pptx
+++ b/Apresentações/Apresentação2204.pptx
@@ -306,7 +306,7 @@
           <a:p>
             <a:fld id="{CD4A1DA0-ED1F-AE48-8F8E-5D400FB10391}" type="datetimeFigureOut">
               <a:rPr lang="en-GB" smtClean="0"/>
-              <a:t>21/04/2020</a:t>
+              <a:t>22/04/2020</a:t>
             </a:fld>
             <a:endParaRPr lang="en-GB"/>
           </a:p>
@@ -644,7 +644,7 @@
           <a:p>
             <a:fld id="{CD4A1DA0-ED1F-AE48-8F8E-5D400FB10391}" type="datetimeFigureOut">
               <a:rPr lang="en-GB" smtClean="0"/>
-              <a:t>21/04/2020</a:t>
+              <a:t>22/04/2020</a:t>
             </a:fld>
             <a:endParaRPr lang="en-GB"/>
           </a:p>
@@ -1045,7 +1045,7 @@
           <a:p>
             <a:fld id="{CD4A1DA0-ED1F-AE48-8F8E-5D400FB10391}" type="datetimeFigureOut">
               <a:rPr lang="en-GB" smtClean="0"/>
-              <a:t>21/04/2020</a:t>
+              <a:t>22/04/2020</a:t>
             </a:fld>
             <a:endParaRPr lang="en-GB"/>
           </a:p>
@@ -1381,7 +1381,7 @@
           <a:p>
             <a:fld id="{CD4A1DA0-ED1F-AE48-8F8E-5D400FB10391}" type="datetimeFigureOut">
               <a:rPr lang="en-GB" smtClean="0"/>
-              <a:t>21/04/2020</a:t>
+              <a:t>22/04/2020</a:t>
             </a:fld>
             <a:endParaRPr lang="en-GB"/>
           </a:p>
@@ -1701,7 +1701,7 @@
           <a:p>
             <a:fld id="{CD4A1DA0-ED1F-AE48-8F8E-5D400FB10391}" type="datetimeFigureOut">
               <a:rPr lang="en-GB" smtClean="0"/>
-              <a:t>21/04/2020</a:t>
+              <a:t>22/04/2020</a:t>
             </a:fld>
             <a:endParaRPr lang="en-GB"/>
           </a:p>
@@ -2097,7 +2097,7 @@
           <a:p>
             <a:fld id="{CD4A1DA0-ED1F-AE48-8F8E-5D400FB10391}" type="datetimeFigureOut">
               <a:rPr lang="en-GB" smtClean="0"/>
-              <a:t>21/04/2020</a:t>
+              <a:t>22/04/2020</a:t>
             </a:fld>
             <a:endParaRPr lang="en-GB"/>
           </a:p>
@@ -2354,7 +2354,7 @@
           <a:p>
             <a:fld id="{CD4A1DA0-ED1F-AE48-8F8E-5D400FB10391}" type="datetimeFigureOut">
               <a:rPr lang="en-GB" smtClean="0"/>
-              <a:t>21/04/2020</a:t>
+              <a:t>22/04/2020</a:t>
             </a:fld>
             <a:endParaRPr lang="en-GB"/>
           </a:p>
@@ -2616,7 +2616,7 @@
           <a:p>
             <a:fld id="{CD4A1DA0-ED1F-AE48-8F8E-5D400FB10391}" type="datetimeFigureOut">
               <a:rPr lang="en-GB" smtClean="0"/>
-              <a:t>21/04/2020</a:t>
+              <a:t>22/04/2020</a:t>
             </a:fld>
             <a:endParaRPr lang="en-GB"/>
           </a:p>
@@ -2878,7 +2878,7 @@
           <a:p>
             <a:fld id="{CD4A1DA0-ED1F-AE48-8F8E-5D400FB10391}" type="datetimeFigureOut">
               <a:rPr lang="en-GB" smtClean="0"/>
-              <a:t>21/04/2020</a:t>
+              <a:t>22/04/2020</a:t>
             </a:fld>
             <a:endParaRPr lang="en-GB"/>
           </a:p>
@@ -3207,7 +3207,7 @@
           <a:p>
             <a:fld id="{CD4A1DA0-ED1F-AE48-8F8E-5D400FB10391}" type="datetimeFigureOut">
               <a:rPr lang="en-GB" smtClean="0"/>
-              <a:t>21/04/2020</a:t>
+              <a:t>22/04/2020</a:t>
             </a:fld>
             <a:endParaRPr lang="en-GB"/>
           </a:p>
@@ -3530,7 +3530,7 @@
           <a:p>
             <a:fld id="{CD4A1DA0-ED1F-AE48-8F8E-5D400FB10391}" type="datetimeFigureOut">
               <a:rPr lang="en-GB" smtClean="0"/>
-              <a:t>21/04/2020</a:t>
+              <a:t>22/04/2020</a:t>
             </a:fld>
             <a:endParaRPr lang="en-GB"/>
           </a:p>
@@ -3987,7 +3987,7 @@
           <a:p>
             <a:fld id="{CD4A1DA0-ED1F-AE48-8F8E-5D400FB10391}" type="datetimeFigureOut">
               <a:rPr lang="en-GB" smtClean="0"/>
-              <a:t>21/04/2020</a:t>
+              <a:t>22/04/2020</a:t>
             </a:fld>
             <a:endParaRPr lang="en-GB"/>
           </a:p>
@@ -4192,7 +4192,7 @@
           <a:p>
             <a:fld id="{CD4A1DA0-ED1F-AE48-8F8E-5D400FB10391}" type="datetimeFigureOut">
               <a:rPr lang="en-GB" smtClean="0"/>
-              <a:t>21/04/2020</a:t>
+              <a:t>22/04/2020</a:t>
             </a:fld>
             <a:endParaRPr lang="en-GB"/>
           </a:p>
@@ -4369,7 +4369,7 @@
           <a:p>
             <a:fld id="{CD4A1DA0-ED1F-AE48-8F8E-5D400FB10391}" type="datetimeFigureOut">
               <a:rPr lang="en-GB" smtClean="0"/>
-              <a:t>21/04/2020</a:t>
+              <a:t>22/04/2020</a:t>
             </a:fld>
             <a:endParaRPr lang="en-GB"/>
           </a:p>
@@ -4702,7 +4702,7 @@
           <a:p>
             <a:fld id="{CD4A1DA0-ED1F-AE48-8F8E-5D400FB10391}" type="datetimeFigureOut">
               <a:rPr lang="en-GB" smtClean="0"/>
-              <a:t>21/04/2020</a:t>
+              <a:t>22/04/2020</a:t>
             </a:fld>
             <a:endParaRPr lang="en-GB"/>
           </a:p>
@@ -5047,7 +5047,7 @@
           <a:p>
             <a:fld id="{CD4A1DA0-ED1F-AE48-8F8E-5D400FB10391}" type="datetimeFigureOut">
               <a:rPr lang="en-GB" smtClean="0"/>
-              <a:t>21/04/2020</a:t>
+              <a:t>22/04/2020</a:t>
             </a:fld>
             <a:endParaRPr lang="en-GB"/>
           </a:p>
@@ -7164,7 +7164,7 @@
           <a:p>
             <a:fld id="{CD4A1DA0-ED1F-AE48-8F8E-5D400FB10391}" type="datetimeFigureOut">
               <a:rPr lang="en-GB" smtClean="0"/>
-              <a:t>21/04/2020</a:t>
+              <a:t>22/04/2020</a:t>
             </a:fld>
             <a:endParaRPr lang="en-GB"/>
           </a:p>
@@ -8267,10 +8267,10 @@
       </p:sp>
       <p:pic>
         <p:nvPicPr>
-          <p:cNvPr id="8" name="Picture 7" descr="A screenshot of a computer screen&#10;&#10;Description automatically generated">
+          <p:cNvPr id="3" name="Picture 2" descr="A screenshot of a computer screen&#10;&#10;Description automatically generated">
             <a:extLst>
               <a:ext uri="{FF2B5EF4-FFF2-40B4-BE49-F238E27FC236}">
-                <a16:creationId xmlns:a16="http://schemas.microsoft.com/office/drawing/2014/main" id="{63C6D710-34F5-1E4D-96C7-A6E5C82A2DC7}"/>
+                <a16:creationId xmlns:a16="http://schemas.microsoft.com/office/drawing/2014/main" id="{790CDDC8-5E21-6E44-9D05-6746D0F1DED7}"/>
               </a:ext>
             </a:extLst>
           </p:cNvPr>
@@ -8287,8 +8287,8 @@
         </p:blipFill>
         <p:spPr>
           <a:xfrm>
-            <a:off x="6096000" y="3795645"/>
-            <a:ext cx="4886878" cy="2653846"/>
+            <a:off x="282054" y="57117"/>
+            <a:ext cx="6096000" cy="3156148"/>
           </a:xfrm>
           <a:prstGeom prst="rect">
             <a:avLst/>
@@ -8297,10 +8297,10 @@
       </p:pic>
       <p:pic>
         <p:nvPicPr>
-          <p:cNvPr id="3" name="Picture 2" descr="A screenshot of a computer screen&#10;&#10;Description automatically generated">
+          <p:cNvPr id="4" name="Picture 3" descr="A screenshot of a computer screen&#10;&#10;Description automatically generated">
             <a:extLst>
               <a:ext uri="{FF2B5EF4-FFF2-40B4-BE49-F238E27FC236}">
-                <a16:creationId xmlns:a16="http://schemas.microsoft.com/office/drawing/2014/main" id="{790CDDC8-5E21-6E44-9D05-6746D0F1DED7}"/>
+                <a16:creationId xmlns:a16="http://schemas.microsoft.com/office/drawing/2014/main" id="{B6BBBE79-248C-F346-A820-DE78EA6C580D}"/>
               </a:ext>
             </a:extLst>
           </p:cNvPr>
@@ -8317,8 +8317,8 @@
         </p:blipFill>
         <p:spPr>
           <a:xfrm>
-            <a:off x="282054" y="57117"/>
-            <a:ext cx="6096000" cy="3156148"/>
+            <a:off x="6096000" y="3429000"/>
+            <a:ext cx="5813945" cy="3270344"/>
           </a:xfrm>
           <a:prstGeom prst="rect">
             <a:avLst/>

</xml_diff>